<commit_message>
add docs for display and httpclient
</commit_message>
<xml_diff>
--- a/进展记录汇报/4.2汇报_任憬羿.pptx
+++ b/进展记录汇报/4.2汇报_任憬羿.pptx
@@ -7027,7 +7027,23 @@
                 <a:ea typeface="微软雅黑 Light" panose="020B0502040204020203" pitchFamily="34" charset="-122"/>
                 <a:cs typeface="Arial" panose="020B0604020202020204" pitchFamily="34" charset="0"/>
               </a:rPr>
-              <a:t>文件系统确实功能较多，如何实现？目前的 </a:t>
+              <a:t>目前的测例看起来也不难，是否还会追加更难的测例？</a:t>
+            </a:r>
+            <a:endParaRPr lang="en-US" altLang="zh-CN" dirty="0">
+              <a:latin typeface="Arial" panose="020B0604020202020204" pitchFamily="34" charset="0"/>
+              <a:ea typeface="微软雅黑 Light" panose="020B0502040204020203" pitchFamily="34" charset="-122"/>
+              <a:cs typeface="Arial" panose="020B0604020202020204" pitchFamily="34" charset="0"/>
+            </a:endParaRPr>
+          </a:p>
+          <a:p>
+            <a:pPr lvl="1"/>
+            <a:r>
+              <a:rPr lang="zh-CN" altLang="en-US" dirty="0">
+                <a:latin typeface="Arial" panose="020B0604020202020204" pitchFamily="34" charset="0"/>
+                <a:ea typeface="微软雅黑 Light" panose="020B0502040204020203" pitchFamily="34" charset="-122"/>
+                <a:cs typeface="Arial" panose="020B0604020202020204" pitchFamily="34" charset="0"/>
+              </a:rPr>
+              <a:t>文件系统功能较多，如何实现？目前的 </a:t>
             </a:r>
             <a:r>
               <a:rPr lang="en-US" altLang="zh-CN" dirty="0">

</xml_diff>